<commit_message>
Software Development Life Cycle
</commit_message>
<xml_diff>
--- a/3.4.The Math Class.pptx
+++ b/3.4.The Math Class.pptx
@@ -110,6 +110,11 @@
       </a:defRPr>
     </a:lvl9pPr>
   </p:defaultTextStyle>
+  <p:extLst>
+    <p:ext uri="{EFAFB233-063F-42B5-8137-9DF3F51BA10A}">
+      <p15:sldGuideLst xmlns:p15="http://schemas.microsoft.com/office/powerpoint/2012/main"/>
+    </p:ext>
+  </p:extLst>
 </p:presentation>
 </file>
 
@@ -859,7 +864,7 @@
             <a:fld id="{B61BEF0D-F0BB-DE4B-95CE-6DB70DBA9567}" type="datetimeFigureOut">
               <a:rPr lang="en-US" dirty="0"/>
               <a:pPr/>
-              <a:t>7/10/2019</a:t>
+              <a:t>7/23/2019</a:t>
             </a:fld>
             <a:endParaRPr lang="en-US" dirty="0"/>
           </a:p>
@@ -1107,7 +1112,7 @@
             <a:fld id="{B61BEF0D-F0BB-DE4B-95CE-6DB70DBA9567}" type="datetimeFigureOut">
               <a:rPr lang="en-US" dirty="0"/>
               <a:pPr/>
-              <a:t>7/10/2019</a:t>
+              <a:t>7/23/2019</a:t>
             </a:fld>
             <a:endParaRPr lang="en-US" dirty="0"/>
           </a:p>
@@ -1418,7 +1423,7 @@
             <a:fld id="{B61BEF0D-F0BB-DE4B-95CE-6DB70DBA9567}" type="datetimeFigureOut">
               <a:rPr lang="en-US" dirty="0"/>
               <a:pPr/>
-              <a:t>7/10/2019</a:t>
+              <a:t>7/23/2019</a:t>
             </a:fld>
             <a:endParaRPr lang="en-US" dirty="0"/>
           </a:p>
@@ -1748,7 +1753,7 @@
             <a:fld id="{B61BEF0D-F0BB-DE4B-95CE-6DB70DBA9567}" type="datetimeFigureOut">
               <a:rPr lang="en-US" dirty="0"/>
               <a:pPr/>
-              <a:t>7/10/2019</a:t>
+              <a:t>7/23/2019</a:t>
             </a:fld>
             <a:endParaRPr lang="en-US" dirty="0"/>
           </a:p>
@@ -2059,7 +2064,7 @@
             <a:fld id="{B61BEF0D-F0BB-DE4B-95CE-6DB70DBA9567}" type="datetimeFigureOut">
               <a:rPr lang="en-US" dirty="0"/>
               <a:pPr/>
-              <a:t>7/10/2019</a:t>
+              <a:t>7/23/2019</a:t>
             </a:fld>
             <a:endParaRPr lang="en-US" dirty="0"/>
           </a:p>
@@ -2449,7 +2454,7 @@
             <a:fld id="{B61BEF0D-F0BB-DE4B-95CE-6DB70DBA9567}" type="datetimeFigureOut">
               <a:rPr lang="en-US" dirty="0"/>
               <a:pPr/>
-              <a:t>7/10/2019</a:t>
+              <a:t>7/23/2019</a:t>
             </a:fld>
             <a:endParaRPr lang="en-US" dirty="0"/>
           </a:p>
@@ -2615,7 +2620,7 @@
           <a:p>
             <a:fld id="{55C6B4A9-1611-4792-9094-5F34BCA07E0B}" type="datetimeFigureOut">
               <a:rPr lang="en-US" dirty="0"/>
-              <a:t>7/10/2019</a:t>
+              <a:t>7/23/2019</a:t>
             </a:fld>
             <a:endParaRPr lang="en-US" dirty="0"/>
           </a:p>
@@ -2791,7 +2796,7 @@
             <a:fld id="{B61BEF0D-F0BB-DE4B-95CE-6DB70DBA9567}" type="datetimeFigureOut">
               <a:rPr lang="en-US" dirty="0"/>
               <a:pPr/>
-              <a:t>7/10/2019</a:t>
+              <a:t>7/23/2019</a:t>
             </a:fld>
             <a:endParaRPr lang="en-US" dirty="0"/>
           </a:p>
@@ -2957,7 +2962,7 @@
           <a:p>
             <a:fld id="{42A54C80-263E-416B-A8E0-580EDEADCBDC}" type="datetimeFigureOut">
               <a:rPr lang="en-US" dirty="0"/>
-              <a:t>7/10/2019</a:t>
+              <a:t>7/23/2019</a:t>
             </a:fld>
             <a:endParaRPr lang="en-US" dirty="0"/>
           </a:p>
@@ -3200,7 +3205,7 @@
             <a:fld id="{B61BEF0D-F0BB-DE4B-95CE-6DB70DBA9567}" type="datetimeFigureOut">
               <a:rPr lang="en-US" dirty="0"/>
               <a:pPr/>
-              <a:t>7/10/2019</a:t>
+              <a:t>7/23/2019</a:t>
             </a:fld>
             <a:endParaRPr lang="en-US" dirty="0"/>
           </a:p>
@@ -3428,7 +3433,7 @@
           <a:p>
             <a:fld id="{42A54C80-263E-416B-A8E0-580EDEADCBDC}" type="datetimeFigureOut">
               <a:rPr lang="en-US" dirty="0"/>
-              <a:t>7/10/2019</a:t>
+              <a:t>7/23/2019</a:t>
             </a:fld>
             <a:endParaRPr lang="en-US" dirty="0"/>
           </a:p>
@@ -3798,7 +3803,7 @@
             <a:fld id="{B61BEF0D-F0BB-DE4B-95CE-6DB70DBA9567}" type="datetimeFigureOut">
               <a:rPr lang="en-US" dirty="0"/>
               <a:pPr/>
-              <a:t>7/10/2019</a:t>
+              <a:t>7/23/2019</a:t>
             </a:fld>
             <a:endParaRPr lang="en-US" dirty="0"/>
           </a:p>
@@ -3918,7 +3923,7 @@
             <a:fld id="{B61BEF0D-F0BB-DE4B-95CE-6DB70DBA9567}" type="datetimeFigureOut">
               <a:rPr lang="en-US" dirty="0"/>
               <a:pPr/>
-              <a:t>7/10/2019</a:t>
+              <a:t>7/23/2019</a:t>
             </a:fld>
             <a:endParaRPr lang="en-US" dirty="0"/>
           </a:p>
@@ -4010,7 +4015,7 @@
             <a:fld id="{B61BEF0D-F0BB-DE4B-95CE-6DB70DBA9567}" type="datetimeFigureOut">
               <a:rPr lang="en-US" dirty="0"/>
               <a:pPr/>
-              <a:t>7/10/2019</a:t>
+              <a:t>7/23/2019</a:t>
             </a:fld>
             <a:endParaRPr lang="en-US" dirty="0"/>
           </a:p>
@@ -4261,7 +4266,7 @@
           <a:p>
             <a:fld id="{42A54C80-263E-416B-A8E0-580EDEADCBDC}" type="datetimeFigureOut">
               <a:rPr lang="en-US" dirty="0"/>
-              <a:t>7/10/2019</a:t>
+              <a:t>7/23/2019</a:t>
             </a:fld>
             <a:endParaRPr lang="en-US" dirty="0"/>
           </a:p>
@@ -4563,7 +4568,7 @@
             <a:fld id="{B61BEF0D-F0BB-DE4B-95CE-6DB70DBA9567}" type="datetimeFigureOut">
               <a:rPr lang="en-US" dirty="0"/>
               <a:pPr/>
-              <a:t>7/10/2019</a:t>
+              <a:t>7/23/2019</a:t>
             </a:fld>
             <a:endParaRPr lang="en-US" dirty="0"/>
           </a:p>
@@ -5261,7 +5266,7 @@
             <a:fld id="{B61BEF0D-F0BB-DE4B-95CE-6DB70DBA9567}" type="datetimeFigureOut">
               <a:rPr lang="en-US" dirty="0"/>
               <a:pPr/>
-              <a:t>7/10/2019</a:t>
+              <a:t>7/23/2019</a:t>
             </a:fld>
             <a:endParaRPr lang="en-US" dirty="0"/>
           </a:p>
@@ -6105,6 +6110,21 @@
                     </m:r>
                   </m:oMath>
                 </a14:m>
+                <a:endParaRPr lang="en-US" b="0" dirty="0"/>
+              </a:p>
+              <a:p>
+                <a:r>
+                  <a:rPr lang="en-US" b="0" dirty="0"/>
+                  <a:t>And many more!</a:t>
+                </a:r>
+              </a:p>
+              <a:p>
+                <a:r>
+                  <a:rPr lang="en-US" dirty="0">
+                    <a:hlinkClick r:id="rId2"/>
+                  </a:rPr>
+                  <a:t>https://docs.oracle.com/javase/8/docs/api/java/lang/Math.html</a:t>
+                </a:r>
                 <a:endParaRPr lang="en-US" dirty="0"/>
               </a:p>
             </p:txBody>
@@ -6133,7 +6153,7 @@
                 <a:ext cx="8980013" cy="3880773"/>
               </a:xfrm>
               <a:blipFill>
-                <a:blip r:embed="rId2"/>
+                <a:blip r:embed="rId3"/>
                 <a:stretch>
                   <a:fillRect l="-136" t="-942"/>
                 </a:stretch>
@@ -6212,8 +6232,8 @@
           </a:p>
         </p:txBody>
       </p:sp>
-      <mc:AlternateContent xmlns:mc="http://schemas.openxmlformats.org/markup-compatibility/2006">
-        <mc:Choice xmlns:a14="http://schemas.microsoft.com/office/drawing/2010/main" Requires="a14">
+      <mc:AlternateContent xmlns:mc="http://schemas.openxmlformats.org/markup-compatibility/2006" xmlns:a14="http://schemas.microsoft.com/office/drawing/2010/main">
+        <mc:Choice Requires="a14">
           <p:sp>
             <p:nvSpPr>
               <p:cNvPr id="3" name="Content Placeholder 2">
@@ -6425,7 +6445,7 @@
             </p:txBody>
           </p:sp>
         </mc:Choice>
-        <mc:Fallback>
+        <mc:Fallback xmlns="">
           <p:sp>
             <p:nvSpPr>
               <p:cNvPr id="3" name="Content Placeholder 2">
@@ -6566,8 +6586,13 @@
           <a:p>
             <a:r>
               <a:rPr lang="en-US" dirty="0"/>
-              <a:t>On interval [0.0, b]:</a:t>
-            </a:r>
+              <a:t>On interval [0.0</a:t>
+            </a:r>
+            <a:r>
+              <a:rPr lang="en-US"/>
+              <a:t>, b):</a:t>
+            </a:r>
+            <a:endParaRPr lang="en-US" dirty="0"/>
           </a:p>
           <a:p>
             <a:pPr lvl="1"/>

</xml_diff>